<commit_message>
Ajout du CR, des graphiques, des etats de Art
</commit_message>
<xml_diff>
--- a/GestionProjet/Objectifs_Rendus/Presentation_Objectifs_Rendus_20sept.pptx
+++ b/GestionProjet/Objectifs_Rendus/Presentation_Objectifs_Rendus_20sept.pptx
@@ -9870,8 +9870,16 @@
               <a:buNone/>
             </a:pPr>
             <a:r>
-              <a:rPr lang="fr-FR" sz="2000"/>
-              <a:t>Étant donné que nous allons utiliser directement un modèle d’IA LLM déjà entraîné, nous n'aurons pas besoin de données pour entraîner notre modèle. Cependant, nous aurons besoin de données pour faire fonctionner l’application. En considérant ces données comme des datasets : </a:t>
+              <a:rPr lang="fr-FR" sz="2000" dirty="0"/>
+              <a:t>Étant donné que nous allons utiliser directement un modèle d’IA LLM déjà entraîné, nous n'aurons pas besoin de données pour entraîner notre modèle. Cependant, nous aurons besoin de données pour faire fonctionner l’application. En considérant ces données comme des </a:t>
+            </a:r>
+            <a:r>
+              <a:rPr lang="fr-FR" sz="2000" dirty="0" err="1"/>
+              <a:t>datasets</a:t>
+            </a:r>
+            <a:r>
+              <a:rPr lang="fr-FR" sz="2000" dirty="0"/>
+              <a:t> : </a:t>
             </a:r>
           </a:p>
           <a:p>
@@ -9880,8 +9888,16 @@
               <a:buAutoNum type="arabicPeriod"/>
             </a:pPr>
             <a:r>
-              <a:rPr lang="fr-FR" sz="2000"/>
-              <a:t>Liste / Catégories / GIFs des exercices</a:t>
+              <a:rPr lang="fr-FR" sz="2000" dirty="0"/>
+              <a:t>Liste / Catégories / </a:t>
+            </a:r>
+            <a:r>
+              <a:rPr lang="fr-FR" sz="2000" dirty="0" err="1"/>
+              <a:t>GIFs</a:t>
+            </a:r>
+            <a:r>
+              <a:rPr lang="fr-FR" sz="2000" dirty="0"/>
+              <a:t> des exercices</a:t>
             </a:r>
           </a:p>
           <a:p>
@@ -9890,12 +9906,12 @@
               <a:buAutoNum type="arabicPeriod"/>
             </a:pPr>
             <a:r>
-              <a:rPr lang="fr-FR" sz="2000"/>
+              <a:rPr lang="fr-FR" sz="2000" dirty="0"/>
               <a:t>Liste des équipements</a:t>
             </a:r>
           </a:p>
           <a:p>
-            <a:endParaRPr lang="fr-FR" sz="2000"/>
+            <a:endParaRPr lang="fr-FR" sz="2000" dirty="0"/>
           </a:p>
         </p:txBody>
       </p:sp>
@@ -10584,7 +10600,7 @@
               <a:buNone/>
             </a:pPr>
             <a:r>
-              <a:rPr lang="en-FR" sz="1500" kern="100">
+              <a:rPr lang="en-FR" sz="1500" kern="100" dirty="0">
                 <a:effectLst/>
                 <a:latin typeface="Aptos" panose="020B0004020202020204" pitchFamily="34" charset="0"/>
                 <a:ea typeface="Aptos" panose="020B0004020202020204" pitchFamily="34" charset="0"/>
@@ -10598,7 +10614,7 @@
               <a:buNone/>
             </a:pPr>
             <a:r>
-              <a:rPr lang="fr-FR" sz="1500" kern="100">
+              <a:rPr lang="fr-FR" sz="1500" kern="100" dirty="0">
                 <a:effectLst/>
                 <a:latin typeface="Aptos" panose="020B0004020202020204" pitchFamily="34" charset="0"/>
                 <a:ea typeface="Aptos" panose="020B0004020202020204" pitchFamily="34" charset="0"/>
@@ -10606,7 +10622,7 @@
               </a:rPr>
               <a:t> </a:t>
             </a:r>
-            <a:endParaRPr lang="en-FR" sz="1500" kern="100">
+            <a:endParaRPr lang="en-FR" sz="1500" kern="100" dirty="0">
               <a:effectLst/>
               <a:latin typeface="Aptos" panose="020B0004020202020204" pitchFamily="34" charset="0"/>
               <a:ea typeface="Aptos" panose="020B0004020202020204" pitchFamily="34" charset="0"/>
@@ -10614,7 +10630,7 @@
             </a:endParaRPr>
           </a:p>
           <a:p>
-            <a:endParaRPr lang="fr-FR" sz="1500"/>
+            <a:endParaRPr lang="fr-FR" sz="1500" dirty="0"/>
           </a:p>
         </p:txBody>
       </p:sp>

</xml_diff>